<commit_message>
add various report files
</commit_message>
<xml_diff>
--- a/Docs/report/architecture_diagram.pptx
+++ b/Docs/report/architecture_diagram.pptx
@@ -104,6 +104,11 @@
       </a:defRPr>
     </a:lvl9pPr>
   </p:defaultTextStyle>
+  <p:extLst>
+    <p:ext uri="{EFAFB233-063F-42B5-8137-9DF3F51BA10A}">
+      <p15:sldGuideLst xmlns:p15="http://schemas.microsoft.com/office/powerpoint/2012/main"/>
+    </p:ext>
+  </p:extLst>
 </p:presentation>
 </file>
 
@@ -254,7 +259,7 @@
           <a:p>
             <a:fld id="{BCAC1719-9549-A14B-89C4-B8087E8BDB57}" type="datetimeFigureOut">
               <a:rPr lang="en-US" smtClean="0"/>
-              <a:t>4/11/19</a:t>
+              <a:t>4/19/19</a:t>
             </a:fld>
             <a:endParaRPr lang="en-US"/>
           </a:p>
@@ -452,7 +457,7 @@
           <a:p>
             <a:fld id="{BCAC1719-9549-A14B-89C4-B8087E8BDB57}" type="datetimeFigureOut">
               <a:rPr lang="en-US" smtClean="0"/>
-              <a:t>4/11/19</a:t>
+              <a:t>4/19/19</a:t>
             </a:fld>
             <a:endParaRPr lang="en-US"/>
           </a:p>
@@ -660,7 +665,7 @@
           <a:p>
             <a:fld id="{BCAC1719-9549-A14B-89C4-B8087E8BDB57}" type="datetimeFigureOut">
               <a:rPr lang="en-US" smtClean="0"/>
-              <a:t>4/11/19</a:t>
+              <a:t>4/19/19</a:t>
             </a:fld>
             <a:endParaRPr lang="en-US"/>
           </a:p>
@@ -858,7 +863,7 @@
           <a:p>
             <a:fld id="{BCAC1719-9549-A14B-89C4-B8087E8BDB57}" type="datetimeFigureOut">
               <a:rPr lang="en-US" smtClean="0"/>
-              <a:t>4/11/19</a:t>
+              <a:t>4/19/19</a:t>
             </a:fld>
             <a:endParaRPr lang="en-US"/>
           </a:p>
@@ -1133,7 +1138,7 @@
           <a:p>
             <a:fld id="{BCAC1719-9549-A14B-89C4-B8087E8BDB57}" type="datetimeFigureOut">
               <a:rPr lang="en-US" smtClean="0"/>
-              <a:t>4/11/19</a:t>
+              <a:t>4/19/19</a:t>
             </a:fld>
             <a:endParaRPr lang="en-US"/>
           </a:p>
@@ -1398,7 +1403,7 @@
           <a:p>
             <a:fld id="{BCAC1719-9549-A14B-89C4-B8087E8BDB57}" type="datetimeFigureOut">
               <a:rPr lang="en-US" smtClean="0"/>
-              <a:t>4/11/19</a:t>
+              <a:t>4/19/19</a:t>
             </a:fld>
             <a:endParaRPr lang="en-US"/>
           </a:p>
@@ -1810,7 +1815,7 @@
           <a:p>
             <a:fld id="{BCAC1719-9549-A14B-89C4-B8087E8BDB57}" type="datetimeFigureOut">
               <a:rPr lang="en-US" smtClean="0"/>
-              <a:t>4/11/19</a:t>
+              <a:t>4/19/19</a:t>
             </a:fld>
             <a:endParaRPr lang="en-US"/>
           </a:p>
@@ -1951,7 +1956,7 @@
           <a:p>
             <a:fld id="{BCAC1719-9549-A14B-89C4-B8087E8BDB57}" type="datetimeFigureOut">
               <a:rPr lang="en-US" smtClean="0"/>
-              <a:t>4/11/19</a:t>
+              <a:t>4/19/19</a:t>
             </a:fld>
             <a:endParaRPr lang="en-US"/>
           </a:p>
@@ -2064,7 +2069,7 @@
           <a:p>
             <a:fld id="{BCAC1719-9549-A14B-89C4-B8087E8BDB57}" type="datetimeFigureOut">
               <a:rPr lang="en-US" smtClean="0"/>
-              <a:t>4/11/19</a:t>
+              <a:t>4/19/19</a:t>
             </a:fld>
             <a:endParaRPr lang="en-US"/>
           </a:p>
@@ -2375,7 +2380,7 @@
           <a:p>
             <a:fld id="{BCAC1719-9549-A14B-89C4-B8087E8BDB57}" type="datetimeFigureOut">
               <a:rPr lang="en-US" smtClean="0"/>
-              <a:t>4/11/19</a:t>
+              <a:t>4/19/19</a:t>
             </a:fld>
             <a:endParaRPr lang="en-US"/>
           </a:p>
@@ -2663,7 +2668,7 @@
           <a:p>
             <a:fld id="{BCAC1719-9549-A14B-89C4-B8087E8BDB57}" type="datetimeFigureOut">
               <a:rPr lang="en-US" smtClean="0"/>
-              <a:t>4/11/19</a:t>
+              <a:t>4/19/19</a:t>
             </a:fld>
             <a:endParaRPr lang="en-US"/>
           </a:p>
@@ -2904,7 +2909,7 @@
           <a:p>
             <a:fld id="{BCAC1719-9549-A14B-89C4-B8087E8BDB57}" type="datetimeFigureOut">
               <a:rPr lang="en-US" smtClean="0"/>
-              <a:t>4/11/19</a:t>
+              <a:t>4/19/19</a:t>
             </a:fld>
             <a:endParaRPr lang="en-US"/>
           </a:p>
@@ -3335,7 +3340,7 @@
         </p:nvSpPr>
         <p:spPr>
           <a:xfrm>
-            <a:off x="1897668" y="188626"/>
+            <a:off x="1860674" y="178319"/>
             <a:ext cx="1742304" cy="1068859"/>
           </a:xfrm>
           <a:prstGeom prst="roundRect">
@@ -3433,7 +3438,7 @@
         </p:nvSpPr>
         <p:spPr>
           <a:xfrm>
-            <a:off x="1860674" y="5462357"/>
+            <a:off x="1860674" y="5365150"/>
             <a:ext cx="1742304" cy="1068859"/>
           </a:xfrm>
           <a:prstGeom prst="roundRect">
@@ -3531,7 +3536,7 @@
         </p:nvSpPr>
         <p:spPr>
           <a:xfrm>
-            <a:off x="5490979" y="5462357"/>
+            <a:off x="5490979" y="5365150"/>
             <a:ext cx="1742304" cy="1068859"/>
           </a:xfrm>
           <a:prstGeom prst="roundRect">
@@ -3680,7 +3685,7 @@
         </p:nvCxnSpPr>
         <p:spPr>
           <a:xfrm>
-            <a:off x="3602978" y="5996787"/>
+            <a:off x="3602978" y="5899580"/>
             <a:ext cx="1888001" cy="0"/>
           </a:xfrm>
           <a:prstGeom prst="straightConnector1">
@@ -3726,7 +3731,7 @@
         </p:nvCxnSpPr>
         <p:spPr>
           <a:xfrm>
-            <a:off x="3639972" y="723056"/>
+            <a:off x="3602978" y="712749"/>
             <a:ext cx="2779370" cy="1169615"/>
           </a:xfrm>
           <a:prstGeom prst="straightConnector1">
@@ -3867,7 +3872,7 @@
         <p:spPr>
           <a:xfrm flipV="1">
             <a:off x="6362131" y="3058290"/>
-            <a:ext cx="855755" cy="2404067"/>
+            <a:ext cx="855755" cy="2306860"/>
           </a:xfrm>
           <a:prstGeom prst="straightConnector1">
             <a:avLst/>
@@ -3956,13 +3961,14 @@
           <p:cNvCxnSpPr>
             <a:cxnSpLocks/>
             <a:stCxn id="9" idx="2"/>
+            <a:endCxn id="47" idx="0"/>
           </p:cNvCxnSpPr>
           <p:nvPr/>
         </p:nvCxnSpPr>
         <p:spPr>
           <a:xfrm>
             <a:off x="2731826" y="2770845"/>
-            <a:ext cx="0" cy="658286"/>
+            <a:ext cx="0" cy="731946"/>
           </a:xfrm>
           <a:prstGeom prst="straightConnector1">
             <a:avLst/>
@@ -4044,7 +4050,7 @@
         <p:spPr>
           <a:xfrm>
             <a:off x="2731826" y="4571650"/>
-            <a:ext cx="0" cy="890707"/>
+            <a:ext cx="0" cy="793500"/>
           </a:xfrm>
           <a:prstGeom prst="straightConnector1">
             <a:avLst/>
@@ -4208,7 +4214,7 @@
         </p:nvSpPr>
         <p:spPr>
           <a:xfrm>
-            <a:off x="493279" y="4929034"/>
+            <a:off x="493279" y="4831827"/>
             <a:ext cx="2041521" cy="369332"/>
           </a:xfrm>
           <a:prstGeom prst="rect">
@@ -4243,7 +4249,7 @@
         </p:nvSpPr>
         <p:spPr>
           <a:xfrm>
-            <a:off x="3621281" y="5001799"/>
+            <a:off x="3621281" y="4904592"/>
             <a:ext cx="2203760" cy="646331"/>
           </a:xfrm>
           <a:prstGeom prst="rect">
@@ -4481,7 +4487,7 @@
         </p:nvSpPr>
         <p:spPr>
           <a:xfrm>
-            <a:off x="224289" y="5513221"/>
+            <a:off x="224289" y="5416014"/>
             <a:ext cx="870642" cy="986310"/>
           </a:xfrm>
           <a:prstGeom prst="can">
@@ -4537,7 +4543,7 @@
         </p:nvSpPr>
         <p:spPr>
           <a:xfrm>
-            <a:off x="8183699" y="5503631"/>
+            <a:off x="8183699" y="5406424"/>
             <a:ext cx="870642" cy="986310"/>
           </a:xfrm>
           <a:prstGeom prst="can">
@@ -4590,7 +4596,7 @@
         </p:nvCxnSpPr>
         <p:spPr>
           <a:xfrm flipV="1">
-            <a:off x="7233283" y="5996786"/>
+            <a:off x="7233283" y="5899579"/>
             <a:ext cx="950416" cy="1"/>
           </a:xfrm>
           <a:prstGeom prst="straightConnector1">
@@ -4637,7 +4643,7 @@
         </p:nvCxnSpPr>
         <p:spPr>
           <a:xfrm flipV="1">
-            <a:off x="1094931" y="5996787"/>
+            <a:off x="1094931" y="5899580"/>
             <a:ext cx="765743" cy="9589"/>
           </a:xfrm>
           <a:prstGeom prst="straightConnector1">
@@ -4778,8 +4784,55 @@
         </p:nvCxnSpPr>
         <p:spPr>
           <a:xfrm flipV="1">
-            <a:off x="1125870" y="723056"/>
-            <a:ext cx="771798" cy="2034"/>
+            <a:off x="1125870" y="712749"/>
+            <a:ext cx="734804" cy="12341"/>
+          </a:xfrm>
+          <a:prstGeom prst="straightConnector1">
+            <a:avLst/>
+          </a:prstGeom>
+          <a:ln w="53975">
+            <a:solidFill>
+              <a:srgbClr val="FF0000"/>
+            </a:solidFill>
+            <a:headEnd type="triangle" w="med" len="med"/>
+            <a:tailEnd type="triangle" w="med" len="med"/>
+          </a:ln>
+        </p:spPr>
+        <p:style>
+          <a:lnRef idx="1">
+            <a:schemeClr val="accent2"/>
+          </a:lnRef>
+          <a:fillRef idx="0">
+            <a:schemeClr val="accent2"/>
+          </a:fillRef>
+          <a:effectRef idx="0">
+            <a:schemeClr val="accent2"/>
+          </a:effectRef>
+          <a:fontRef idx="minor">
+            <a:schemeClr val="tx1"/>
+          </a:fontRef>
+        </p:style>
+      </p:cxnSp>
+      <p:cxnSp>
+        <p:nvCxnSpPr>
+          <p:cNvPr id="34" name="Straight Arrow Connector 33">
+            <a:extLst>
+              <a:ext uri="{FF2B5EF4-FFF2-40B4-BE49-F238E27FC236}">
+                <a16:creationId xmlns:a16="http://schemas.microsoft.com/office/drawing/2014/main" id="{4DC98432-C359-6743-B622-597730CE947F}"/>
+              </a:ext>
+            </a:extLst>
+          </p:cNvPr>
+          <p:cNvCxnSpPr>
+            <a:cxnSpLocks/>
+            <a:stCxn id="4" idx="2"/>
+            <a:endCxn id="9" idx="0"/>
+          </p:cNvCxnSpPr>
+          <p:nvPr/>
+        </p:nvCxnSpPr>
+        <p:spPr>
+          <a:xfrm>
+            <a:off x="2731826" y="1247178"/>
+            <a:ext cx="0" cy="454808"/>
           </a:xfrm>
           <a:prstGeom prst="straightConnector1">
             <a:avLst/>

</xml_diff>